<commit_message>
add info for hyperparams
</commit_message>
<xml_diff>
--- a/asafonov, hands-on ml.pptx
+++ b/asafonov, hands-on ml.pptx
@@ -5,7 +5,7 @@
     <p:sldMasterId id="2147483684" r:id="rId1"/>
   </p:sldMasterIdLst>
   <p:notesMasterIdLst>
-    <p:notesMasterId r:id="rId23"/>
+    <p:notesMasterId r:id="rId25"/>
   </p:notesMasterIdLst>
   <p:sldIdLst>
     <p:sldId id="256" r:id="rId2"/>
@@ -22,13 +22,15 @@
     <p:sldId id="269" r:id="rId13"/>
     <p:sldId id="270" r:id="rId14"/>
     <p:sldId id="271" r:id="rId15"/>
-    <p:sldId id="264" r:id="rId16"/>
-    <p:sldId id="273" r:id="rId17"/>
-    <p:sldId id="272" r:id="rId18"/>
-    <p:sldId id="274" r:id="rId19"/>
-    <p:sldId id="275" r:id="rId20"/>
-    <p:sldId id="276" r:id="rId21"/>
-    <p:sldId id="277" r:id="rId22"/>
+    <p:sldId id="279" r:id="rId16"/>
+    <p:sldId id="264" r:id="rId17"/>
+    <p:sldId id="273" r:id="rId18"/>
+    <p:sldId id="272" r:id="rId19"/>
+    <p:sldId id="274" r:id="rId20"/>
+    <p:sldId id="275" r:id="rId21"/>
+    <p:sldId id="276" r:id="rId22"/>
+    <p:sldId id="277" r:id="rId23"/>
+    <p:sldId id="278" r:id="rId24"/>
   </p:sldIdLst>
   <p:sldSz cx="9144000" cy="6858000" type="screen4x3"/>
   <p:notesSz cx="6858000" cy="9144000"/>
@@ -228,7 +230,7 @@
           <a:p>
             <a:fld id="{A7361AFD-ACB8-4A0B-8094-3365D10ECF87}" type="datetimeFigureOut">
               <a:rPr lang="ru-RU" smtClean="0"/>
-              <a:t>07.11.2018</a:t>
+              <a:t>08.11.2018</a:t>
             </a:fld>
             <a:endParaRPr lang="ru-RU"/>
           </a:p>
@@ -994,11 +996,7 @@
           <a:p>
             <a:r>
               <a:rPr lang="ru-RU" dirty="0" smtClean="0"/>
-              <a:t>Рассказать </a:t>
-            </a:r>
-            <a:r>
-              <a:rPr lang="ru-RU" dirty="0" smtClean="0"/>
-              <a:t>про </a:t>
+              <a:t>Рассказать про </a:t>
             </a:r>
             <a:r>
               <a:rPr lang="ru-RU" dirty="0" err="1" smtClean="0"/>
@@ -1013,24 +1011,13 @@
             </a:r>
             <a:r>
               <a:rPr lang="en-US" baseline="0" dirty="0" smtClean="0"/>
-              <a:t> - overkill</a:t>
+              <a:t> - </a:t>
+            </a:r>
+            <a:r>
+              <a:rPr lang="en-US" baseline="0" dirty="0" smtClean="0"/>
+              <a:t>overkill</a:t>
             </a:r>
             <a:endParaRPr lang="ru-RU" dirty="0" smtClean="0"/>
-          </a:p>
-          <a:p>
-            <a:r>
-              <a:rPr lang="ru-RU" dirty="0" smtClean="0"/>
-              <a:t>След</a:t>
-            </a:r>
-            <a:r>
-              <a:rPr lang="ru-RU" baseline="0" dirty="0" smtClean="0"/>
-              <a:t> слайд про </a:t>
-            </a:r>
-            <a:r>
-              <a:rPr lang="ru-RU" baseline="0" dirty="0" err="1" smtClean="0"/>
-              <a:t>перетренерованность</a:t>
-            </a:r>
-            <a:endParaRPr lang="ru-RU" dirty="0"/>
           </a:p>
         </p:txBody>
       </p:sp>
@@ -1115,10 +1102,59 @@
           <a:lstStyle/>
           <a:p>
             <a:r>
-              <a:rPr lang="en-US" b="1" dirty="0" smtClean="0"/>
-              <a:t>GO TO NOTEBOOK</a:t>
-            </a:r>
-            <a:endParaRPr lang="ru-RU" b="1" dirty="0"/>
+              <a:rPr lang="en-US" sz="1200" b="1" dirty="0" smtClean="0"/>
+              <a:t>regularized</a:t>
+            </a:r>
+            <a:r>
+              <a:rPr lang="en-US" sz="1200" dirty="0" smtClean="0"/>
+              <a:t> – </a:t>
+            </a:r>
+            <a:r>
+              <a:rPr lang="ru-RU" sz="1200" dirty="0" smtClean="0"/>
+              <a:t>Рассказать</a:t>
+            </a:r>
+            <a:r>
+              <a:rPr lang="ru-RU" sz="1200" baseline="0" dirty="0" smtClean="0"/>
+              <a:t> про запоминание. Минимизацию функции</a:t>
+            </a:r>
+            <a:endParaRPr lang="en-US" dirty="0" smtClean="0"/>
+          </a:p>
+          <a:p>
+            <a:r>
+              <a:rPr lang="ru-RU" dirty="0" smtClean="0"/>
+              <a:t>Рассказать про </a:t>
+            </a:r>
+            <a:r>
+              <a:rPr lang="ru-RU" dirty="0" err="1" smtClean="0"/>
+              <a:t>гиперпараметры</a:t>
+            </a:r>
+            <a:endParaRPr lang="ru-RU" dirty="0" smtClean="0"/>
+          </a:p>
+          <a:p>
+            <a:r>
+              <a:rPr lang="en-US" dirty="0" smtClean="0"/>
+              <a:t>NN</a:t>
+            </a:r>
+            <a:r>
+              <a:rPr lang="en-US" baseline="0" dirty="0" smtClean="0"/>
+              <a:t> - overkill</a:t>
+            </a:r>
+            <a:endParaRPr lang="ru-RU" dirty="0" smtClean="0"/>
+          </a:p>
+          <a:p>
+            <a:r>
+              <a:rPr lang="ru-RU" dirty="0" smtClean="0"/>
+              <a:t>След</a:t>
+            </a:r>
+            <a:r>
+              <a:rPr lang="ru-RU" baseline="0" dirty="0" smtClean="0"/>
+              <a:t> слайд про </a:t>
+            </a:r>
+            <a:r>
+              <a:rPr lang="ru-RU" baseline="0" dirty="0" err="1" smtClean="0"/>
+              <a:t>перетренерованность</a:t>
+            </a:r>
+            <a:endParaRPr lang="ru-RU" dirty="0"/>
           </a:p>
         </p:txBody>
       </p:sp>
@@ -1148,7 +1184,7 @@
     </p:spTree>
     <p:extLst>
       <p:ext uri="{BB962C8B-B14F-4D97-AF65-F5344CB8AC3E}">
-        <p14:creationId xmlns:p14="http://schemas.microsoft.com/office/powerpoint/2010/main" val="2122270198"/>
+        <p14:creationId xmlns:p14="http://schemas.microsoft.com/office/powerpoint/2010/main" val="1158358049"/>
       </p:ext>
     </p:extLst>
   </p:cSld>
@@ -1202,7 +1238,11 @@
           <a:bodyPr/>
           <a:lstStyle/>
           <a:p>
-            <a:endParaRPr lang="ru-RU" dirty="0"/>
+            <a:r>
+              <a:rPr lang="en-US" b="1" dirty="0" smtClean="0"/>
+              <a:t>GO TO NOTEBOOK</a:t>
+            </a:r>
+            <a:endParaRPr lang="ru-RU" b="1" dirty="0"/>
           </a:p>
         </p:txBody>
       </p:sp>
@@ -1232,7 +1272,7 @@
     </p:spTree>
     <p:extLst>
       <p:ext uri="{BB962C8B-B14F-4D97-AF65-F5344CB8AC3E}">
-        <p14:creationId xmlns:p14="http://schemas.microsoft.com/office/powerpoint/2010/main" val="2302548424"/>
+        <p14:creationId xmlns:p14="http://schemas.microsoft.com/office/powerpoint/2010/main" val="2122270198"/>
       </p:ext>
     </p:extLst>
   </p:cSld>
@@ -1316,7 +1356,7 @@
     </p:spTree>
     <p:extLst>
       <p:ext uri="{BB962C8B-B14F-4D97-AF65-F5344CB8AC3E}">
-        <p14:creationId xmlns:p14="http://schemas.microsoft.com/office/powerpoint/2010/main" val="768565419"/>
+        <p14:creationId xmlns:p14="http://schemas.microsoft.com/office/powerpoint/2010/main" val="2302548424"/>
       </p:ext>
     </p:extLst>
   </p:cSld>
@@ -1370,85 +1410,6 @@
           <a:bodyPr/>
           <a:lstStyle/>
           <a:p>
-            <a:r>
-              <a:rPr lang="en-US" dirty="0" err="1" smtClean="0"/>
-              <a:t>Gini</a:t>
-            </a:r>
-            <a:r>
-              <a:rPr lang="en-US" dirty="0" smtClean="0"/>
-              <a:t> impurity is a measure of how often a randomly chosen element from the set would be incorrectly labeled if it was randomly labeled according to the distribution of labels in the subset</a:t>
-            </a:r>
-          </a:p>
-          <a:p>
-            <a:endParaRPr lang="en-US" dirty="0" smtClean="0"/>
-          </a:p>
-          <a:p>
-            <a:r>
-              <a:rPr lang="en-US" b="1" dirty="0" smtClean="0"/>
-              <a:t>entropy</a:t>
-            </a:r>
-            <a:r>
-              <a:rPr lang="en-US" dirty="0" smtClean="0"/>
-              <a:t> – </a:t>
-            </a:r>
-            <a:r>
-              <a:rPr lang="ru-RU" dirty="0" smtClean="0"/>
-              <a:t>Мальчик </a:t>
-            </a:r>
-            <a:r>
-              <a:rPr lang="ru-RU" dirty="0" smtClean="0"/>
-              <a:t>Коля</a:t>
-            </a:r>
-            <a:endParaRPr lang="en-US" dirty="0" smtClean="0"/>
-          </a:p>
-          <a:p>
-            <a:endParaRPr lang="en-US" dirty="0" smtClean="0"/>
-          </a:p>
-          <a:p>
-            <a:r>
-              <a:rPr lang="en-US" dirty="0" smtClean="0"/>
-              <a:t>if </a:t>
-            </a:r>
-            <a:r>
-              <a:rPr lang="en-US" dirty="0" err="1" smtClean="0"/>
-              <a:t>min_samples_split</a:t>
-            </a:r>
-            <a:r>
-              <a:rPr lang="en-US" dirty="0" smtClean="0"/>
-              <a:t> = 5, and there are 7 samples at an internal node, then the split is allowed. But let's say the split results in two leaves, one with 1 sample, and another with 6 samples. If </a:t>
-            </a:r>
-            <a:r>
-              <a:rPr lang="en-US" dirty="0" err="1" smtClean="0"/>
-              <a:t>min_samples_leaf</a:t>
-            </a:r>
-            <a:r>
-              <a:rPr lang="en-US" dirty="0" smtClean="0"/>
-              <a:t> = 2, then the split won't be allowed (even if the internal node has 7 samples) because one of the leaves resulted will have less then the minimum number of samples required to be at a leaf node.</a:t>
-            </a:r>
-          </a:p>
-          <a:p>
-            <a:endParaRPr lang="en-US" dirty="0" smtClean="0"/>
-          </a:p>
-          <a:p>
-            <a:r>
-              <a:rPr lang="en-US" dirty="0" err="1" smtClean="0"/>
-              <a:t>min_samples_leaf</a:t>
-            </a:r>
-            <a:r>
-              <a:rPr lang="en-US" dirty="0" smtClean="0"/>
-              <a:t> guarantees a minimum number of samples in every leaf, no matter the value of </a:t>
-            </a:r>
-            <a:r>
-              <a:rPr lang="en-US" dirty="0" err="1" smtClean="0"/>
-              <a:t>min_samples_split</a:t>
-            </a:r>
-            <a:r>
-              <a:rPr lang="en-US" dirty="0" smtClean="0"/>
-              <a:t>.</a:t>
-            </a:r>
-            <a:endParaRPr lang="ru-RU" dirty="0" smtClean="0"/>
-          </a:p>
-          <a:p>
             <a:endParaRPr lang="ru-RU" dirty="0"/>
           </a:p>
         </p:txBody>
@@ -1479,7 +1440,7 @@
     </p:spTree>
     <p:extLst>
       <p:ext uri="{BB962C8B-B14F-4D97-AF65-F5344CB8AC3E}">
-        <p14:creationId xmlns:p14="http://schemas.microsoft.com/office/powerpoint/2010/main" val="2329181150"/>
+        <p14:creationId xmlns:p14="http://schemas.microsoft.com/office/powerpoint/2010/main" val="768565419"/>
       </p:ext>
     </p:extLst>
   </p:cSld>
@@ -1534,9 +1495,80 @@
           <a:lstStyle/>
           <a:p>
             <a:r>
+              <a:rPr lang="en-US" dirty="0" err="1" smtClean="0"/>
+              <a:t>Gini</a:t>
+            </a:r>
+            <a:r>
               <a:rPr lang="en-US" dirty="0" smtClean="0"/>
-              <a:t>FROM SLIDE</a:t>
-            </a:r>
+              <a:t> impurity is a measure of how often a randomly chosen element from the set would be incorrectly labeled if it was randomly labeled according to the distribution of labels in the subset</a:t>
+            </a:r>
+          </a:p>
+          <a:p>
+            <a:endParaRPr lang="en-US" dirty="0" smtClean="0"/>
+          </a:p>
+          <a:p>
+            <a:r>
+              <a:rPr lang="en-US" b="1" dirty="0" smtClean="0"/>
+              <a:t>entropy</a:t>
+            </a:r>
+            <a:r>
+              <a:rPr lang="en-US" dirty="0" smtClean="0"/>
+              <a:t> – </a:t>
+            </a:r>
+            <a:r>
+              <a:rPr lang="ru-RU" dirty="0" smtClean="0"/>
+              <a:t>Мальчик Коля</a:t>
+            </a:r>
+            <a:endParaRPr lang="en-US" dirty="0" smtClean="0"/>
+          </a:p>
+          <a:p>
+            <a:endParaRPr lang="en-US" dirty="0" smtClean="0"/>
+          </a:p>
+          <a:p>
+            <a:r>
+              <a:rPr lang="en-US" dirty="0" smtClean="0"/>
+              <a:t>if </a:t>
+            </a:r>
+            <a:r>
+              <a:rPr lang="en-US" dirty="0" err="1" smtClean="0"/>
+              <a:t>min_samples_split</a:t>
+            </a:r>
+            <a:r>
+              <a:rPr lang="en-US" dirty="0" smtClean="0"/>
+              <a:t> = 5, and there are 7 samples at an internal node, then the split is allowed. But let's say the split results in two leaves, one with 1 sample, and another with 6 samples. If </a:t>
+            </a:r>
+            <a:r>
+              <a:rPr lang="en-US" dirty="0" err="1" smtClean="0"/>
+              <a:t>min_samples_leaf</a:t>
+            </a:r>
+            <a:r>
+              <a:rPr lang="en-US" dirty="0" smtClean="0"/>
+              <a:t> = 2, then the split won't be allowed (even if the internal node has 7 samples) because one of the leaves resulted will have less then the minimum number of samples required to be at a leaf node.</a:t>
+            </a:r>
+          </a:p>
+          <a:p>
+            <a:endParaRPr lang="en-US" dirty="0" smtClean="0"/>
+          </a:p>
+          <a:p>
+            <a:r>
+              <a:rPr lang="en-US" dirty="0" err="1" smtClean="0"/>
+              <a:t>min_samples_leaf</a:t>
+            </a:r>
+            <a:r>
+              <a:rPr lang="en-US" dirty="0" smtClean="0"/>
+              <a:t> guarantees a minimum number of samples in every leaf, no matter the value of </a:t>
+            </a:r>
+            <a:r>
+              <a:rPr lang="en-US" dirty="0" err="1" smtClean="0"/>
+              <a:t>min_samples_split</a:t>
+            </a:r>
+            <a:r>
+              <a:rPr lang="en-US" dirty="0" smtClean="0"/>
+              <a:t>.</a:t>
+            </a:r>
+            <a:endParaRPr lang="ru-RU" dirty="0" smtClean="0"/>
+          </a:p>
+          <a:p>
             <a:endParaRPr lang="ru-RU" dirty="0"/>
           </a:p>
         </p:txBody>
@@ -1622,31 +1654,10 @@
           <a:lstStyle/>
           <a:p>
             <a:r>
-              <a:rPr lang="en-US" b="0" dirty="0" smtClean="0"/>
-              <a:t>Powerful with small datasets.</a:t>
-            </a:r>
-          </a:p>
-          <a:p>
-            <a:r>
-              <a:rPr lang="en-US" b="0" dirty="0" smtClean="0"/>
-              <a:t>Have big complexity. Scales</a:t>
-            </a:r>
-            <a:r>
-              <a:rPr lang="en-US" b="0" baseline="0" dirty="0" smtClean="0"/>
-              <a:t> bad with </a:t>
-            </a:r>
-            <a:r>
-              <a:rPr lang="en-US" b="0" baseline="0" smtClean="0"/>
-              <a:t>datasets above 10000</a:t>
-            </a:r>
-            <a:endParaRPr lang="en-US" b="0" dirty="0" smtClean="0"/>
-          </a:p>
-          <a:p>
-            <a:r>
-              <a:rPr lang="en-US" b="1" dirty="0" smtClean="0"/>
-              <a:t>GO TO Notebook</a:t>
-            </a:r>
-            <a:endParaRPr lang="ru-RU" b="1" dirty="0"/>
+              <a:rPr lang="en-US" dirty="0" smtClean="0"/>
+              <a:t>FROM SLIDE</a:t>
+            </a:r>
+            <a:endParaRPr lang="ru-RU" dirty="0"/>
           </a:p>
         </p:txBody>
       </p:sp>
@@ -1895,6 +1906,115 @@
             <a:fld id="{7CF45BFD-CE41-428D-AF26-A0EEADFECF69}" type="slidenum">
               <a:rPr lang="ru-RU" smtClean="0"/>
               <a:t>21</a:t>
+            </a:fld>
+            <a:endParaRPr lang="ru-RU"/>
+          </a:p>
+        </p:txBody>
+      </p:sp>
+    </p:spTree>
+    <p:extLst>
+      <p:ext uri="{BB962C8B-B14F-4D97-AF65-F5344CB8AC3E}">
+        <p14:creationId xmlns:p14="http://schemas.microsoft.com/office/powerpoint/2010/main" val="2329181150"/>
+      </p:ext>
+    </p:extLst>
+  </p:cSld>
+  <p:clrMapOvr>
+    <a:masterClrMapping/>
+  </p:clrMapOvr>
+</p:notes>
+</file>
+
+<file path=ppt/notesSlides/notesSlide21.xml><?xml version="1.0" encoding="utf-8"?>
+<p:notes xmlns:a="http://schemas.openxmlformats.org/drawingml/2006/main" xmlns:r="http://schemas.openxmlformats.org/officeDocument/2006/relationships" xmlns:p="http://schemas.openxmlformats.org/presentationml/2006/main">
+  <p:cSld>
+    <p:spTree>
+      <p:nvGrpSpPr>
+        <p:cNvPr id="1" name=""/>
+        <p:cNvGrpSpPr/>
+        <p:nvPr/>
+      </p:nvGrpSpPr>
+      <p:grpSpPr>
+        <a:xfrm>
+          <a:off x="0" y="0"/>
+          <a:ext cx="0" cy="0"/>
+          <a:chOff x="0" y="0"/>
+          <a:chExt cx="0" cy="0"/>
+        </a:xfrm>
+      </p:grpSpPr>
+      <p:sp>
+        <p:nvSpPr>
+          <p:cNvPr id="2" name="Образ слайда 1"/>
+          <p:cNvSpPr>
+            <a:spLocks noGrp="1" noRot="1" noChangeAspect="1"/>
+          </p:cNvSpPr>
+          <p:nvPr>
+            <p:ph type="sldImg"/>
+          </p:nvPr>
+        </p:nvSpPr>
+        <p:spPr/>
+      </p:sp>
+      <p:sp>
+        <p:nvSpPr>
+          <p:cNvPr id="3" name="Заметки 2"/>
+          <p:cNvSpPr>
+            <a:spLocks noGrp="1"/>
+          </p:cNvSpPr>
+          <p:nvPr>
+            <p:ph type="body" idx="1"/>
+          </p:nvPr>
+        </p:nvSpPr>
+        <p:spPr/>
+        <p:txBody>
+          <a:bodyPr/>
+          <a:lstStyle/>
+          <a:p>
+            <a:r>
+              <a:rPr lang="en-US" b="0" dirty="0" smtClean="0"/>
+              <a:t>Powerful with small datasets.</a:t>
+            </a:r>
+          </a:p>
+          <a:p>
+            <a:r>
+              <a:rPr lang="en-US" b="0" dirty="0" smtClean="0"/>
+              <a:t>Have big complexity. Scales</a:t>
+            </a:r>
+            <a:r>
+              <a:rPr lang="en-US" b="0" baseline="0" dirty="0" smtClean="0"/>
+              <a:t> bad with </a:t>
+            </a:r>
+            <a:r>
+              <a:rPr lang="en-US" b="0" baseline="0" smtClean="0"/>
+              <a:t>datasets above 10000</a:t>
+            </a:r>
+            <a:endParaRPr lang="en-US" b="0" dirty="0" smtClean="0"/>
+          </a:p>
+          <a:p>
+            <a:r>
+              <a:rPr lang="en-US" b="1" dirty="0" smtClean="0"/>
+              <a:t>GO TO Notebook</a:t>
+            </a:r>
+            <a:endParaRPr lang="ru-RU" b="1" dirty="0"/>
+          </a:p>
+        </p:txBody>
+      </p:sp>
+      <p:sp>
+        <p:nvSpPr>
+          <p:cNvPr id="4" name="Номер слайда 3"/>
+          <p:cNvSpPr>
+            <a:spLocks noGrp="1"/>
+          </p:cNvSpPr>
+          <p:nvPr>
+            <p:ph type="sldNum" sz="quarter" idx="10"/>
+          </p:nvPr>
+        </p:nvSpPr>
+        <p:spPr/>
+        <p:txBody>
+          <a:bodyPr/>
+          <a:lstStyle/>
+          <a:p>
+            <a:fld id="{7CF45BFD-CE41-428D-AF26-A0EEADFECF69}" type="slidenum">
+              <a:rPr lang="ru-RU" smtClean="0"/>
+              <a:t>22</a:t>
             </a:fld>
             <a:endParaRPr lang="ru-RU"/>
           </a:p>
@@ -3071,7 +3191,7 @@
           <a:p>
             <a:fld id="{B4C71EC6-210F-42DE-9C53-41977AD35B3D}" type="datetimeFigureOut">
               <a:rPr lang="ru-RU" smtClean="0"/>
-              <a:t>07.11.2018</a:t>
+              <a:t>08.11.2018</a:t>
             </a:fld>
             <a:endParaRPr lang="ru-RU"/>
           </a:p>
@@ -3241,7 +3361,7 @@
           <a:p>
             <a:fld id="{B4C71EC6-210F-42DE-9C53-41977AD35B3D}" type="datetimeFigureOut">
               <a:rPr lang="ru-RU" smtClean="0"/>
-              <a:t>07.11.2018</a:t>
+              <a:t>08.11.2018</a:t>
             </a:fld>
             <a:endParaRPr lang="ru-RU"/>
           </a:p>
@@ -3421,7 +3541,7 @@
           <a:p>
             <a:fld id="{B4C71EC6-210F-42DE-9C53-41977AD35B3D}" type="datetimeFigureOut">
               <a:rPr lang="ru-RU" smtClean="0"/>
-              <a:t>07.11.2018</a:t>
+              <a:t>08.11.2018</a:t>
             </a:fld>
             <a:endParaRPr lang="ru-RU"/>
           </a:p>
@@ -3591,7 +3711,7 @@
           <a:p>
             <a:fld id="{B4C71EC6-210F-42DE-9C53-41977AD35B3D}" type="datetimeFigureOut">
               <a:rPr lang="ru-RU" smtClean="0"/>
-              <a:t>07.11.2018</a:t>
+              <a:t>08.11.2018</a:t>
             </a:fld>
             <a:endParaRPr lang="ru-RU"/>
           </a:p>
@@ -3837,7 +3957,7 @@
           <a:p>
             <a:fld id="{B4C71EC6-210F-42DE-9C53-41977AD35B3D}" type="datetimeFigureOut">
               <a:rPr lang="ru-RU" smtClean="0"/>
-              <a:t>07.11.2018</a:t>
+              <a:t>08.11.2018</a:t>
             </a:fld>
             <a:endParaRPr lang="ru-RU"/>
           </a:p>
@@ -4125,7 +4245,7 @@
           <a:p>
             <a:fld id="{B4C71EC6-210F-42DE-9C53-41977AD35B3D}" type="datetimeFigureOut">
               <a:rPr lang="ru-RU" smtClean="0"/>
-              <a:t>07.11.2018</a:t>
+              <a:t>08.11.2018</a:t>
             </a:fld>
             <a:endParaRPr lang="ru-RU"/>
           </a:p>
@@ -4547,7 +4667,7 @@
           <a:p>
             <a:fld id="{B4C71EC6-210F-42DE-9C53-41977AD35B3D}" type="datetimeFigureOut">
               <a:rPr lang="ru-RU" smtClean="0"/>
-              <a:t>07.11.2018</a:t>
+              <a:t>08.11.2018</a:t>
             </a:fld>
             <a:endParaRPr lang="ru-RU"/>
           </a:p>
@@ -4665,7 +4785,7 @@
           <a:p>
             <a:fld id="{B4C71EC6-210F-42DE-9C53-41977AD35B3D}" type="datetimeFigureOut">
               <a:rPr lang="ru-RU" smtClean="0"/>
-              <a:t>07.11.2018</a:t>
+              <a:t>08.11.2018</a:t>
             </a:fld>
             <a:endParaRPr lang="ru-RU"/>
           </a:p>
@@ -4760,7 +4880,7 @@
           <a:p>
             <a:fld id="{B4C71EC6-210F-42DE-9C53-41977AD35B3D}" type="datetimeFigureOut">
               <a:rPr lang="ru-RU" smtClean="0"/>
-              <a:t>07.11.2018</a:t>
+              <a:t>08.11.2018</a:t>
             </a:fld>
             <a:endParaRPr lang="ru-RU"/>
           </a:p>
@@ -5037,7 +5157,7 @@
           <a:p>
             <a:fld id="{B4C71EC6-210F-42DE-9C53-41977AD35B3D}" type="datetimeFigureOut">
               <a:rPr lang="ru-RU" smtClean="0"/>
-              <a:t>07.11.2018</a:t>
+              <a:t>08.11.2018</a:t>
             </a:fld>
             <a:endParaRPr lang="ru-RU"/>
           </a:p>
@@ -5290,7 +5410,7 @@
           <a:p>
             <a:fld id="{B4C71EC6-210F-42DE-9C53-41977AD35B3D}" type="datetimeFigureOut">
               <a:rPr lang="ru-RU" smtClean="0"/>
-              <a:t>07.11.2018</a:t>
+              <a:t>08.11.2018</a:t>
             </a:fld>
             <a:endParaRPr lang="ru-RU"/>
           </a:p>
@@ -5503,7 +5623,7 @@
           <a:p>
             <a:fld id="{B4C71EC6-210F-42DE-9C53-41977AD35B3D}" type="datetimeFigureOut">
               <a:rPr lang="ru-RU" smtClean="0"/>
-              <a:t>07.11.2018</a:t>
+              <a:t>08.11.2018</a:t>
             </a:fld>
             <a:endParaRPr lang="ru-RU"/>
           </a:p>
@@ -7579,7 +7699,7 @@
         <p:spPr>
           <a:xfrm>
             <a:off x="291125" y="1795821"/>
-            <a:ext cx="8241315" cy="3693319"/>
+            <a:ext cx="8241315" cy="4801314"/>
           </a:xfrm>
           <a:prstGeom prst="rect">
             <a:avLst/>
@@ -7594,7 +7714,15 @@
           <a:p>
             <a:r>
               <a:rPr lang="en-US" b="1" dirty="0" smtClean="0"/>
-              <a:t>Loss function:</a:t>
+              <a:t>Penalty</a:t>
+            </a:r>
+            <a:r>
+              <a:rPr lang="en-US" dirty="0" smtClean="0"/>
+              <a:t> </a:t>
+            </a:r>
+            <a:r>
+              <a:rPr lang="en-US" dirty="0" smtClean="0"/>
+              <a:t>:</a:t>
             </a:r>
           </a:p>
           <a:p>
@@ -7604,59 +7732,6 @@
             </a:pPr>
             <a:r>
               <a:rPr lang="en-US" b="1" dirty="0" smtClean="0"/>
-              <a:t>Log -</a:t>
-            </a:r>
-            <a:r>
-              <a:rPr lang="en-US" dirty="0" smtClean="0"/>
-              <a:t> </a:t>
-            </a:r>
-            <a:r>
-              <a:rPr lang="en-US" dirty="0"/>
-              <a:t>loss gives logistic regression, a probabilistic </a:t>
-            </a:r>
-            <a:r>
-              <a:rPr lang="en-US" dirty="0" smtClean="0"/>
-              <a:t>classifier</a:t>
-            </a:r>
-          </a:p>
-          <a:p>
-            <a:pPr marL="285750" indent="-285750">
-              <a:buFont typeface="Arial" pitchFamily="34" charset="0"/>
-              <a:buChar char="•"/>
-            </a:pPr>
-            <a:r>
-              <a:rPr lang="en-US" b="1" dirty="0" smtClean="0"/>
-              <a:t>Hinge - </a:t>
-            </a:r>
-            <a:r>
-              <a:rPr lang="en-US" dirty="0"/>
-              <a:t>(soft-margin) linear Support Vector </a:t>
-            </a:r>
-            <a:r>
-              <a:rPr lang="en-US" dirty="0" smtClean="0"/>
-              <a:t>Machine</a:t>
-            </a:r>
-          </a:p>
-          <a:p>
-            <a:endParaRPr lang="en-US" dirty="0" smtClean="0"/>
-          </a:p>
-          <a:p>
-            <a:r>
-              <a:rPr lang="en-US" b="1" dirty="0" smtClean="0"/>
-              <a:t>Penalty</a:t>
-            </a:r>
-            <a:r>
-              <a:rPr lang="en-US" dirty="0" smtClean="0"/>
-              <a:t> :</a:t>
-            </a:r>
-          </a:p>
-          <a:p>
-            <a:pPr marL="285750" indent="-285750">
-              <a:buFont typeface="Arial" pitchFamily="34" charset="0"/>
-              <a:buChar char="•"/>
-            </a:pPr>
-            <a:r>
-              <a:rPr lang="en-US" b="1" dirty="0" smtClean="0"/>
               <a:t>L2 - </a:t>
             </a:r>
             <a:r>
@@ -7669,53 +7744,11 @@
             </a:r>
             <a:r>
               <a:rPr lang="en-US" dirty="0"/>
-              <a:t> for linear SVM models</a:t>
-            </a:r>
-            <a:endParaRPr lang="en-US" b="1" dirty="0" smtClean="0"/>
-          </a:p>
-          <a:p>
-            <a:pPr marL="285750" indent="-285750">
-              <a:buFont typeface="Arial" pitchFamily="34" charset="0"/>
-              <a:buChar char="•"/>
-            </a:pPr>
-            <a:r>
-              <a:rPr lang="en-US" b="1" dirty="0" smtClean="0"/>
-              <a:t>L1 - </a:t>
+              <a:t> for linear SVM </a:t>
             </a:r>
             <a:r>
               <a:rPr lang="en-US" dirty="0" smtClean="0"/>
-              <a:t>leads </a:t>
-            </a:r>
-            <a:r>
-              <a:rPr lang="en-US" dirty="0"/>
-              <a:t>to sparse solutions, driving most coefficients to zero</a:t>
-            </a:r>
-            <a:endParaRPr lang="en-US" b="1" dirty="0" smtClean="0"/>
-          </a:p>
-          <a:p>
-            <a:pPr marL="285750" indent="-285750">
-              <a:buFont typeface="Arial" pitchFamily="34" charset="0"/>
-              <a:buChar char="•"/>
-            </a:pPr>
-            <a:r>
-              <a:rPr lang="en-US" b="1" dirty="0" err="1" smtClean="0"/>
-              <a:t>Elasticnet</a:t>
-            </a:r>
-            <a:r>
-              <a:rPr lang="en-US" b="1" dirty="0" smtClean="0"/>
-              <a:t> - </a:t>
-            </a:r>
-            <a:r>
-              <a:rPr lang="en-US" dirty="0" smtClean="0"/>
-              <a:t>convex </a:t>
-            </a:r>
-            <a:r>
-              <a:rPr lang="en-US" dirty="0"/>
-              <a:t>combination of L2 and </a:t>
-            </a:r>
-            <a:r>
-              <a:rPr lang="en-US" dirty="0" smtClean="0"/>
-              <a:t>L1</a:t>
+              <a:t>models (Ridge regression)</a:t>
             </a:r>
           </a:p>
           <a:p>
@@ -7726,31 +7759,6 @@
             <a:endParaRPr lang="en-US" b="1" dirty="0"/>
           </a:p>
           <a:p>
-            <a:r>
-              <a:rPr lang="en-US" b="1" dirty="0" smtClean="0"/>
-              <a:t>Alpha</a:t>
-            </a:r>
-            <a:r>
-              <a:rPr lang="en-US" dirty="0"/>
-              <a:t> - Constant that multiplies the regularization </a:t>
-            </a:r>
-            <a:r>
-              <a:rPr lang="en-US" dirty="0" smtClean="0"/>
-              <a:t>term</a:t>
-            </a:r>
-          </a:p>
-          <a:p>
-            <a:r>
-              <a:rPr lang="en-US" b="1" dirty="0" err="1"/>
-              <a:t>max_iter</a:t>
-            </a:r>
-            <a:r>
-              <a:rPr lang="en-US" dirty="0"/>
-              <a:t> -maximum number of passes over the training data (aka epochs)</a:t>
-            </a:r>
-            <a:endParaRPr lang="en-US" b="1" dirty="0" smtClean="0"/>
-          </a:p>
-          <a:p>
             <a:pPr marL="285750" indent="-285750">
               <a:buFont typeface="Arial" pitchFamily="34" charset="0"/>
               <a:buChar char="•"/>
@@ -7758,6 +7766,127 @@
             <a:endParaRPr lang="en-US" b="1" dirty="0" smtClean="0"/>
           </a:p>
           <a:p>
+            <a:pPr marL="285750" indent="-285750">
+              <a:buFont typeface="Arial" pitchFamily="34" charset="0"/>
+              <a:buChar char="•"/>
+            </a:pPr>
+            <a:endParaRPr lang="en-US" b="1" dirty="0"/>
+          </a:p>
+          <a:p>
+            <a:pPr marL="285750" indent="-285750">
+              <a:buFont typeface="Arial" pitchFamily="34" charset="0"/>
+              <a:buChar char="•"/>
+            </a:pPr>
+            <a:endParaRPr lang="en-US" b="1" dirty="0" smtClean="0"/>
+          </a:p>
+          <a:p>
+            <a:pPr marL="285750" indent="-285750">
+              <a:buFont typeface="Arial" pitchFamily="34" charset="0"/>
+              <a:buChar char="•"/>
+            </a:pPr>
+            <a:r>
+              <a:rPr lang="en-US" b="1" dirty="0" smtClean="0"/>
+              <a:t>L1 - </a:t>
+            </a:r>
+            <a:r>
+              <a:rPr lang="en-US" dirty="0" smtClean="0"/>
+              <a:t>leads </a:t>
+            </a:r>
+            <a:r>
+              <a:rPr lang="en-US" dirty="0"/>
+              <a:t>to sparse solutions, driving most coefficients to </a:t>
+            </a:r>
+            <a:r>
+              <a:rPr lang="en-US" dirty="0" smtClean="0"/>
+              <a:t>zero (Lasso regression)</a:t>
+            </a:r>
+          </a:p>
+          <a:p>
+            <a:pPr marL="285750" indent="-285750">
+              <a:buFont typeface="Arial" pitchFamily="34" charset="0"/>
+              <a:buChar char="•"/>
+            </a:pPr>
+            <a:endParaRPr lang="en-US" b="1" dirty="0"/>
+          </a:p>
+          <a:p>
+            <a:pPr marL="285750" indent="-285750">
+              <a:buFont typeface="Arial" pitchFamily="34" charset="0"/>
+              <a:buChar char="•"/>
+            </a:pPr>
+            <a:endParaRPr lang="en-US" b="1" dirty="0" smtClean="0"/>
+          </a:p>
+          <a:p>
+            <a:endParaRPr lang="en-US" b="1" dirty="0" smtClean="0"/>
+          </a:p>
+          <a:p>
+            <a:pPr marL="285750" indent="-285750">
+              <a:buFont typeface="Arial" pitchFamily="34" charset="0"/>
+              <a:buChar char="•"/>
+            </a:pPr>
+            <a:endParaRPr lang="en-US" b="1" dirty="0" smtClean="0"/>
+          </a:p>
+          <a:p>
+            <a:r>
+              <a:rPr lang="en-US" dirty="0"/>
+              <a:t>The key difference between these techniques is that </a:t>
+            </a:r>
+            <a:r>
+              <a:rPr lang="en-US" b="1" dirty="0"/>
+              <a:t>Lasso</a:t>
+            </a:r>
+            <a:r>
+              <a:rPr lang="en-US" dirty="0"/>
+              <a:t> shrinks the less important feature’s coefficient to zero thus, removing some feature altogether. So, this works well for </a:t>
+            </a:r>
+            <a:r>
+              <a:rPr lang="en-US" b="1" dirty="0"/>
+              <a:t>feature selection </a:t>
+            </a:r>
+            <a:r>
+              <a:rPr lang="en-US" dirty="0"/>
+              <a:t>in case we have a huge number of features.</a:t>
+            </a:r>
+            <a:endParaRPr lang="en-US" dirty="0" smtClean="0"/>
+          </a:p>
+          <a:p>
+            <a:pPr marL="285750" indent="-285750">
+              <a:buFont typeface="Arial" pitchFamily="34" charset="0"/>
+              <a:buChar char="•"/>
+            </a:pPr>
+            <a:endParaRPr lang="en-US" b="1" dirty="0"/>
+          </a:p>
+          <a:p>
+            <a:endParaRPr lang="en-US" b="1" dirty="0"/>
+          </a:p>
+          <a:p>
+            <a:pPr marL="285750" indent="-285750">
+              <a:buFont typeface="Arial" pitchFamily="34" charset="0"/>
+              <a:buChar char="•"/>
+            </a:pPr>
+            <a:r>
+              <a:rPr lang="en-US" b="1" dirty="0" err="1" smtClean="0"/>
+              <a:t>Elasticnet</a:t>
+            </a:r>
+            <a:r>
+              <a:rPr lang="en-US" b="1" dirty="0" smtClean="0"/>
+              <a:t> </a:t>
+            </a:r>
+            <a:r>
+              <a:rPr lang="en-US" b="1" dirty="0" smtClean="0"/>
+              <a:t>- </a:t>
+            </a:r>
+            <a:r>
+              <a:rPr lang="en-US" dirty="0" smtClean="0"/>
+              <a:t>convex </a:t>
+            </a:r>
+            <a:r>
+              <a:rPr lang="en-US" dirty="0"/>
+              <a:t>combination of L2 and </a:t>
+            </a:r>
+            <a:r>
+              <a:rPr lang="en-US" dirty="0" smtClean="0"/>
+              <a:t>L1</a:t>
+            </a:r>
             <a:endParaRPr lang="ru-RU" b="1" dirty="0"/>
           </a:p>
         </p:txBody>
@@ -7812,6 +7941,54 @@
           </a:p>
         </p:txBody>
       </p:sp>
+      <p:pic>
+        <p:nvPicPr>
+          <p:cNvPr id="6" name="Picture 5"/>
+          <p:cNvPicPr>
+            <a:picLocks noChangeAspect="1"/>
+          </p:cNvPicPr>
+          <p:nvPr/>
+        </p:nvPicPr>
+        <p:blipFill>
+          <a:blip r:embed="rId3"/>
+          <a:stretch>
+            <a:fillRect/>
+          </a:stretch>
+        </p:blipFill>
+        <p:spPr>
+          <a:xfrm>
+            <a:off x="3278307" y="2429366"/>
+            <a:ext cx="2266950" cy="904875"/>
+          </a:xfrm>
+          <a:prstGeom prst="rect">
+            <a:avLst/>
+          </a:prstGeom>
+        </p:spPr>
+      </p:pic>
+      <p:pic>
+        <p:nvPicPr>
+          <p:cNvPr id="7" name="Picture 6"/>
+          <p:cNvPicPr>
+            <a:picLocks noChangeAspect="1"/>
+          </p:cNvPicPr>
+          <p:nvPr/>
+        </p:nvPicPr>
+        <p:blipFill>
+          <a:blip r:embed="rId4"/>
+          <a:stretch>
+            <a:fillRect/>
+          </a:stretch>
+        </p:blipFill>
+        <p:spPr>
+          <a:xfrm>
+            <a:off x="3308970" y="3811215"/>
+            <a:ext cx="2343150" cy="857250"/>
+          </a:xfrm>
+          <a:prstGeom prst="rect">
+            <a:avLst/>
+          </a:prstGeom>
+        </p:spPr>
+      </p:pic>
     </p:spTree>
     <p:extLst>
       <p:ext uri="{BB962C8B-B14F-4D97-AF65-F5344CB8AC3E}">
@@ -7826,6 +8003,267 @@
 </file>
 
 <file path=ppt/slides/slide15.xml><?xml version="1.0" encoding="utf-8"?>
+<p:sld xmlns:a="http://schemas.openxmlformats.org/drawingml/2006/main" xmlns:r="http://schemas.openxmlformats.org/officeDocument/2006/relationships" xmlns:p="http://schemas.openxmlformats.org/presentationml/2006/main">
+  <p:cSld>
+    <p:spTree>
+      <p:nvGrpSpPr>
+        <p:cNvPr id="1" name=""/>
+        <p:cNvGrpSpPr/>
+        <p:nvPr/>
+      </p:nvGrpSpPr>
+      <p:grpSpPr>
+        <a:xfrm>
+          <a:off x="0" y="0"/>
+          <a:ext cx="0" cy="0"/>
+          <a:chOff x="0" y="0"/>
+          <a:chExt cx="0" cy="0"/>
+        </a:xfrm>
+      </p:grpSpPr>
+      <p:sp>
+        <p:nvSpPr>
+          <p:cNvPr id="2" name="Заголовок 1"/>
+          <p:cNvSpPr>
+            <a:spLocks noGrp="1"/>
+          </p:cNvSpPr>
+          <p:nvPr>
+            <p:ph type="title"/>
+          </p:nvPr>
+        </p:nvSpPr>
+        <p:spPr/>
+        <p:txBody>
+          <a:bodyPr>
+            <a:normAutofit/>
+          </a:bodyPr>
+          <a:lstStyle/>
+          <a:p>
+            <a:r>
+              <a:rPr lang="en-US" dirty="0" err="1" smtClean="0"/>
+              <a:t>SGDClassifier</a:t>
+            </a:r>
+            <a:endParaRPr lang="ru-RU" dirty="0"/>
+          </a:p>
+        </p:txBody>
+      </p:sp>
+      <p:sp>
+        <p:nvSpPr>
+          <p:cNvPr id="3" name="Объект 2"/>
+          <p:cNvSpPr>
+            <a:spLocks noGrp="1"/>
+          </p:cNvSpPr>
+          <p:nvPr>
+            <p:ph idx="1"/>
+          </p:nvPr>
+        </p:nvSpPr>
+        <p:spPr>
+          <a:xfrm>
+            <a:off x="457200" y="1238541"/>
+            <a:ext cx="8229600" cy="462267"/>
+          </a:xfrm>
+        </p:spPr>
+        <p:txBody>
+          <a:bodyPr>
+            <a:normAutofit/>
+          </a:bodyPr>
+          <a:lstStyle/>
+          <a:p>
+            <a:pPr marL="0" indent="0">
+              <a:buNone/>
+            </a:pPr>
+            <a:r>
+              <a:rPr lang="en-US" sz="1800" b="1" dirty="0"/>
+              <a:t>regularized</a:t>
+            </a:r>
+            <a:r>
+              <a:rPr lang="en-US" sz="1800" dirty="0"/>
+              <a:t> linear models with </a:t>
+            </a:r>
+            <a:r>
+              <a:rPr lang="en-US" sz="1800" b="1" dirty="0"/>
+              <a:t>stochastic gradient descent</a:t>
+            </a:r>
+            <a:r>
+              <a:rPr lang="en-US" sz="1800" dirty="0"/>
+              <a:t> (SGD) learning</a:t>
+            </a:r>
+            <a:endParaRPr lang="ru-RU" sz="1800" dirty="0"/>
+          </a:p>
+        </p:txBody>
+      </p:sp>
+      <p:sp>
+        <p:nvSpPr>
+          <p:cNvPr id="4" name="TextBox 3"/>
+          <p:cNvSpPr txBox="1"/>
+          <p:nvPr/>
+        </p:nvSpPr>
+        <p:spPr>
+          <a:xfrm>
+            <a:off x="291125" y="1795821"/>
+            <a:ext cx="8241315" cy="2308324"/>
+          </a:xfrm>
+          <a:prstGeom prst="rect">
+            <a:avLst/>
+          </a:prstGeom>
+          <a:noFill/>
+        </p:spPr>
+        <p:txBody>
+          <a:bodyPr wrap="square" rtlCol="0">
+            <a:spAutoFit/>
+          </a:bodyPr>
+          <a:lstStyle/>
+          <a:p>
+            <a:r>
+              <a:rPr lang="en-US" b="1" dirty="0" smtClean="0"/>
+              <a:t>Loss function:</a:t>
+            </a:r>
+          </a:p>
+          <a:p>
+            <a:pPr marL="285750" indent="-285750">
+              <a:buFont typeface="Arial" pitchFamily="34" charset="0"/>
+              <a:buChar char="•"/>
+            </a:pPr>
+            <a:r>
+              <a:rPr lang="en-US" b="1" dirty="0" smtClean="0"/>
+              <a:t>Log -</a:t>
+            </a:r>
+            <a:r>
+              <a:rPr lang="en-US" dirty="0" smtClean="0"/>
+              <a:t> </a:t>
+            </a:r>
+            <a:r>
+              <a:rPr lang="en-US" dirty="0"/>
+              <a:t>loss gives logistic regression, a probabilistic </a:t>
+            </a:r>
+            <a:r>
+              <a:rPr lang="en-US" dirty="0" smtClean="0"/>
+              <a:t>classifier</a:t>
+            </a:r>
+          </a:p>
+          <a:p>
+            <a:pPr marL="285750" indent="-285750">
+              <a:buFont typeface="Arial" pitchFamily="34" charset="0"/>
+              <a:buChar char="•"/>
+            </a:pPr>
+            <a:r>
+              <a:rPr lang="en-US" b="1" dirty="0" smtClean="0"/>
+              <a:t>Hinge - </a:t>
+            </a:r>
+            <a:r>
+              <a:rPr lang="en-US" dirty="0"/>
+              <a:t>(soft-margin) linear Support Vector </a:t>
+            </a:r>
+            <a:r>
+              <a:rPr lang="en-US" dirty="0" smtClean="0"/>
+              <a:t>Machine</a:t>
+            </a:r>
+          </a:p>
+          <a:p>
+            <a:endParaRPr lang="en-US" dirty="0" smtClean="0"/>
+          </a:p>
+          <a:p>
+            <a:r>
+              <a:rPr lang="en-US" b="1" dirty="0" smtClean="0"/>
+              <a:t>Alpha</a:t>
+            </a:r>
+            <a:r>
+              <a:rPr lang="en-US" dirty="0" smtClean="0"/>
+              <a:t> </a:t>
+            </a:r>
+            <a:r>
+              <a:rPr lang="en-US" dirty="0"/>
+              <a:t>- Constant that multiplies the regularization </a:t>
+            </a:r>
+            <a:r>
+              <a:rPr lang="en-US" dirty="0" smtClean="0"/>
+              <a:t>term</a:t>
+            </a:r>
+          </a:p>
+          <a:p>
+            <a:r>
+              <a:rPr lang="en-US" b="1" dirty="0" err="1"/>
+              <a:t>max_iter</a:t>
+            </a:r>
+            <a:r>
+              <a:rPr lang="en-US" dirty="0"/>
+              <a:t> -maximum number of passes over the training data (aka epochs)</a:t>
+            </a:r>
+            <a:endParaRPr lang="en-US" b="1" dirty="0" smtClean="0"/>
+          </a:p>
+          <a:p>
+            <a:pPr marL="285750" indent="-285750">
+              <a:buFont typeface="Arial" pitchFamily="34" charset="0"/>
+              <a:buChar char="•"/>
+            </a:pPr>
+            <a:endParaRPr lang="en-US" b="1" dirty="0" smtClean="0"/>
+          </a:p>
+          <a:p>
+            <a:endParaRPr lang="ru-RU" b="1" dirty="0"/>
+          </a:p>
+        </p:txBody>
+      </p:sp>
+      <p:sp>
+        <p:nvSpPr>
+          <p:cNvPr id="5" name="Right Arrow 4"/>
+          <p:cNvSpPr/>
+          <p:nvPr/>
+        </p:nvSpPr>
+        <p:spPr>
+          <a:xfrm>
+            <a:off x="259427" y="130622"/>
+            <a:ext cx="298376" cy="288032"/>
+          </a:xfrm>
+          <a:prstGeom prst="rightArrow">
+            <a:avLst/>
+          </a:prstGeom>
+          <a:solidFill>
+            <a:schemeClr val="bg1"/>
+          </a:solidFill>
+          <a:ln>
+            <a:solidFill>
+              <a:schemeClr val="bg1">
+                <a:lumMod val="85000"/>
+              </a:schemeClr>
+            </a:solidFill>
+          </a:ln>
+        </p:spPr>
+        <p:style>
+          <a:lnRef idx="2">
+            <a:schemeClr val="accent1">
+              <a:shade val="50000"/>
+            </a:schemeClr>
+          </a:lnRef>
+          <a:fillRef idx="1">
+            <a:schemeClr val="accent1"/>
+          </a:fillRef>
+          <a:effectRef idx="0">
+            <a:schemeClr val="accent1"/>
+          </a:effectRef>
+          <a:fontRef idx="minor">
+            <a:schemeClr val="lt1"/>
+          </a:fontRef>
+        </p:style>
+        <p:txBody>
+          <a:bodyPr rtlCol="0" anchor="ctr"/>
+          <a:lstStyle/>
+          <a:p>
+            <a:pPr algn="ctr"/>
+            <a:endParaRPr lang="en-US"/>
+          </a:p>
+        </p:txBody>
+      </p:sp>
+    </p:spTree>
+    <p:extLst>
+      <p:ext uri="{BB962C8B-B14F-4D97-AF65-F5344CB8AC3E}">
+        <p14:creationId xmlns:p14="http://schemas.microsoft.com/office/powerpoint/2010/main" val="4271821996"/>
+      </p:ext>
+    </p:extLst>
+  </p:cSld>
+  <p:clrMapOvr>
+    <a:masterClrMapping/>
+  </p:clrMapOvr>
+</p:sld>
+</file>
+
+<file path=ppt/slides/slide16.xml><?xml version="1.0" encoding="utf-8"?>
 <p:sld xmlns:a="http://schemas.openxmlformats.org/drawingml/2006/main" xmlns:r="http://schemas.openxmlformats.org/officeDocument/2006/relationships" xmlns:p="http://schemas.openxmlformats.org/presentationml/2006/main">
   <p:cSld>
     <p:spTree>
@@ -8052,7 +8490,7 @@
 </p:sld>
 </file>
 
-<file path=ppt/slides/slide16.xml><?xml version="1.0" encoding="utf-8"?>
+<file path=ppt/slides/slide17.xml><?xml version="1.0" encoding="utf-8"?>
 <p:sld xmlns:a="http://schemas.openxmlformats.org/drawingml/2006/main" xmlns:r="http://schemas.openxmlformats.org/officeDocument/2006/relationships" xmlns:p="http://schemas.openxmlformats.org/presentationml/2006/main">
   <p:cSld>
     <p:spTree>
@@ -8221,7 +8659,7 @@
 </p:sld>
 </file>
 
-<file path=ppt/slides/slide17.xml><?xml version="1.0" encoding="utf-8"?>
+<file path=ppt/slides/slide18.xml><?xml version="1.0" encoding="utf-8"?>
 <p:sld xmlns:a="http://schemas.openxmlformats.org/drawingml/2006/main" xmlns:r="http://schemas.openxmlformats.org/officeDocument/2006/relationships" xmlns:p="http://schemas.openxmlformats.org/presentationml/2006/main">
   <p:cSld>
     <p:spTree>
@@ -8408,15 +8846,7 @@
             </a:pPr>
             <a:r>
               <a:rPr lang="en-US" dirty="0" smtClean="0"/>
-              <a:t>Split data in </a:t>
-            </a:r>
-            <a:r>
-              <a:rPr lang="en-US" dirty="0" smtClean="0"/>
-              <a:t>overlapping/gaping </a:t>
-            </a:r>
-            <a:r>
-              <a:rPr lang="en-US" dirty="0" smtClean="0"/>
-              <a:t>subsets (based on information gain)</a:t>
+              <a:t>Split data in overlapping/gaping subsets (based on information gain)</a:t>
             </a:r>
           </a:p>
           <a:p>
@@ -8455,7 +8885,7 @@
 </p:sld>
 </file>
 
-<file path=ppt/slides/slide18.xml><?xml version="1.0" encoding="utf-8"?>
+<file path=ppt/slides/slide19.xml><?xml version="1.0" encoding="utf-8"?>
 <p:sld xmlns:a="http://schemas.openxmlformats.org/drawingml/2006/main" xmlns:r="http://schemas.openxmlformats.org/officeDocument/2006/relationships" xmlns:p="http://schemas.openxmlformats.org/presentationml/2006/main">
   <p:cSld>
     <p:spTree>
@@ -8522,7 +8952,7 @@
         <p:spPr>
           <a:xfrm>
             <a:off x="291125" y="1795821"/>
-            <a:ext cx="8241315" cy="3139321"/>
+            <a:ext cx="8241315" cy="3970318"/>
           </a:xfrm>
           <a:prstGeom prst="rect">
             <a:avLst/>
@@ -8633,12 +9063,62 @@
             <a:endParaRPr lang="en-US" b="1" dirty="0" smtClean="0"/>
           </a:p>
           <a:p>
+            <a:endParaRPr lang="en-US" b="1" dirty="0" smtClean="0"/>
+          </a:p>
+          <a:p>
+            <a:r>
+              <a:rPr lang="en-US" b="1" dirty="0" err="1" smtClean="0"/>
+              <a:t>max_depth</a:t>
+            </a:r>
+            <a:r>
+              <a:rPr lang="en-US" b="1" dirty="0" smtClean="0"/>
+              <a:t> </a:t>
+            </a:r>
+            <a:r>
+              <a:rPr lang="en-US" dirty="0"/>
+              <a:t>- The maximum depth of the tree</a:t>
+            </a:r>
+            <a:endParaRPr lang="en-US" dirty="0" smtClean="0"/>
+          </a:p>
+          <a:p>
+            <a:r>
+              <a:rPr lang="en-US" b="1" dirty="0" err="1"/>
+              <a:t>min_samples_split</a:t>
+            </a:r>
+            <a:r>
+              <a:rPr lang="en-US" dirty="0"/>
+              <a:t> - number of samples required to split an internal </a:t>
+            </a:r>
+            <a:r>
+              <a:rPr lang="en-US" dirty="0" smtClean="0"/>
+              <a:t>node</a:t>
+            </a:r>
+          </a:p>
+          <a:p>
+            <a:r>
+              <a:rPr lang="en-US" b="1" dirty="0" err="1" smtClean="0"/>
+              <a:t>min_samples_leaf</a:t>
+            </a:r>
+            <a:r>
+              <a:rPr lang="en-US" b="1" dirty="0" smtClean="0"/>
+              <a:t> - </a:t>
+            </a:r>
+            <a:r>
+              <a:rPr lang="en-US" dirty="0"/>
+              <a:t>The minimum number of samples required to be at a leaf </a:t>
+            </a:r>
+            <a:r>
+              <a:rPr lang="en-US" dirty="0" smtClean="0"/>
+              <a:t>node</a:t>
+            </a:r>
+          </a:p>
+          <a:p>
             <a:endParaRPr lang="en-US" b="1" dirty="0"/>
           </a:p>
           <a:p>
             <a:r>
               <a:rPr lang="en-US" b="1" dirty="0" err="1"/>
-              <a:t>max_depth</a:t>
+              <a:t>max_features</a:t>
             </a:r>
             <a:r>
               <a:rPr lang="en-US" b="1" dirty="0"/>
@@ -8646,38 +9126,15 @@
             </a:r>
             <a:r>
               <a:rPr lang="en-US" dirty="0"/>
-              <a:t>- The maximum depth of the tree</a:t>
+              <a:t>- size of the random subsets of features to split a node</a:t>
+            </a:r>
+          </a:p>
+          <a:p>
+            <a:r>
+              <a:rPr lang="en-US" dirty="0" smtClean="0"/>
+              <a:t>Lower – reduce variance, higher – increase bias. </a:t>
             </a:r>
             <a:endParaRPr lang="en-US" dirty="0" smtClean="0"/>
-          </a:p>
-          <a:p>
-            <a:r>
-              <a:rPr lang="en-US" b="1" dirty="0" err="1"/>
-              <a:t>min_samples_split</a:t>
-            </a:r>
-            <a:r>
-              <a:rPr lang="en-US" dirty="0"/>
-              <a:t> - number of samples required to split an internal </a:t>
-            </a:r>
-            <a:r>
-              <a:rPr lang="en-US" dirty="0" smtClean="0"/>
-              <a:t>node</a:t>
-            </a:r>
-          </a:p>
-          <a:p>
-            <a:r>
-              <a:rPr lang="en-US" b="1" dirty="0" err="1" smtClean="0"/>
-              <a:t>min_samples_leaf</a:t>
-            </a:r>
-            <a:r>
-              <a:rPr lang="en-US" b="1" dirty="0" smtClean="0"/>
-              <a:t> - </a:t>
-            </a:r>
-            <a:r>
-              <a:rPr lang="en-US" dirty="0"/>
-              <a:t>The minimum number of samples required to be at a leaf node</a:t>
-            </a:r>
-            <a:endParaRPr lang="en-US" b="1" dirty="0" smtClean="0"/>
           </a:p>
           <a:p>
             <a:pPr marL="285750" indent="-285750">
@@ -8751,220 +9208,6 @@
   <p:clrMapOvr>
     <a:masterClrMapping/>
   </p:clrMapOvr>
-</p:sld>
-</file>
-
-<file path=ppt/slides/slide19.xml><?xml version="1.0" encoding="utf-8"?>
-<p:sld xmlns:a="http://schemas.openxmlformats.org/drawingml/2006/main" xmlns:r="http://schemas.openxmlformats.org/officeDocument/2006/relationships" xmlns:p="http://schemas.openxmlformats.org/presentationml/2006/main">
-  <p:cSld>
-    <p:spTree>
-      <p:nvGrpSpPr>
-        <p:cNvPr id="1" name=""/>
-        <p:cNvGrpSpPr/>
-        <p:nvPr/>
-      </p:nvGrpSpPr>
-      <p:grpSpPr>
-        <a:xfrm>
-          <a:off x="0" y="0"/>
-          <a:ext cx="0" cy="0"/>
-          <a:chOff x="0" y="0"/>
-          <a:chExt cx="0" cy="0"/>
-        </a:xfrm>
-      </p:grpSpPr>
-      <p:sp>
-        <p:nvSpPr>
-          <p:cNvPr id="2" name="Заголовок 1"/>
-          <p:cNvSpPr>
-            <a:spLocks noGrp="1"/>
-          </p:cNvSpPr>
-          <p:nvPr>
-            <p:ph type="title"/>
-          </p:nvPr>
-        </p:nvSpPr>
-        <p:spPr/>
-        <p:txBody>
-          <a:bodyPr>
-            <a:normAutofit/>
-          </a:bodyPr>
-          <a:lstStyle/>
-          <a:p>
-            <a:r>
-              <a:rPr lang="en-US" dirty="0" smtClean="0"/>
-              <a:t>Support Vector Machine</a:t>
-            </a:r>
-            <a:endParaRPr lang="ru-RU" dirty="0"/>
-          </a:p>
-        </p:txBody>
-      </p:sp>
-      <p:pic>
-        <p:nvPicPr>
-          <p:cNvPr id="11266" name="Picture 2"/>
-          <p:cNvPicPr>
-            <a:picLocks noChangeAspect="1" noChangeArrowheads="1"/>
-          </p:cNvPicPr>
-          <p:nvPr/>
-        </p:nvPicPr>
-        <p:blipFill>
-          <a:blip r:embed="rId3" cstate="print">
-            <a:extLst>
-              <a:ext uri="{28A0092B-C50C-407E-A947-70E740481C1C}">
-                <a14:useLocalDpi xmlns:a14="http://schemas.microsoft.com/office/drawing/2010/main" val="0"/>
-              </a:ext>
-            </a:extLst>
-          </a:blip>
-          <a:srcRect/>
-          <a:stretch>
-            <a:fillRect/>
-          </a:stretch>
-        </p:blipFill>
-        <p:spPr bwMode="auto">
-          <a:xfrm>
-            <a:off x="1979712" y="1628800"/>
-            <a:ext cx="5006706" cy="4869159"/>
-          </a:xfrm>
-          <a:prstGeom prst="rect">
-            <a:avLst/>
-          </a:prstGeom>
-          <a:noFill/>
-          <a:ln>
-            <a:noFill/>
-          </a:ln>
-          <a:effectLst/>
-          <a:extLst>
-            <a:ext uri="{909E8E84-426E-40DD-AFC4-6F175D3DCCD1}">
-              <a14:hiddenFill xmlns:a14="http://schemas.microsoft.com/office/drawing/2010/main">
-                <a:solidFill>
-                  <a:schemeClr val="accent1"/>
-                </a:solidFill>
-              </a14:hiddenFill>
-            </a:ext>
-            <a:ext uri="{91240B29-F687-4F45-9708-019B960494DF}">
-              <a14:hiddenLine xmlns:a14="http://schemas.microsoft.com/office/drawing/2010/main" w="9525">
-                <a:solidFill>
-                  <a:schemeClr val="tx1"/>
-                </a:solidFill>
-                <a:miter lim="800000"/>
-                <a:headEnd/>
-                <a:tailEnd/>
-              </a14:hiddenLine>
-            </a:ext>
-            <a:ext uri="{AF507438-7753-43E0-B8FC-AC1667EBCBE1}">
-              <a14:hiddenEffects xmlns:a14="http://schemas.microsoft.com/office/drawing/2010/main">
-                <a:effectLst>
-                  <a:outerShdw dist="35921" dir="2700000" algn="ctr" rotWithShape="0">
-                    <a:schemeClr val="bg2"/>
-                  </a:outerShdw>
-                </a:effectLst>
-              </a14:hiddenEffects>
-            </a:ext>
-          </a:extLst>
-        </p:spPr>
-      </p:pic>
-      <p:sp>
-        <p:nvSpPr>
-          <p:cNvPr id="3" name="TextBox 2"/>
-          <p:cNvSpPr txBox="1"/>
-          <p:nvPr/>
-        </p:nvSpPr>
-        <p:spPr>
-          <a:xfrm>
-            <a:off x="395536" y="1124744"/>
-            <a:ext cx="8424936" cy="369332"/>
-          </a:xfrm>
-          <a:prstGeom prst="rect">
-            <a:avLst/>
-          </a:prstGeom>
-          <a:noFill/>
-        </p:spPr>
-        <p:txBody>
-          <a:bodyPr wrap="square" rtlCol="0">
-            <a:spAutoFit/>
-          </a:bodyPr>
-          <a:lstStyle/>
-          <a:p>
-            <a:r>
-              <a:rPr lang="en-US" dirty="0" smtClean="0"/>
-              <a:t>Create </a:t>
-            </a:r>
-            <a:r>
-              <a:rPr lang="en-US" dirty="0" err="1" smtClean="0"/>
-              <a:t>hyperplane</a:t>
-            </a:r>
-            <a:r>
-              <a:rPr lang="en-US" dirty="0" smtClean="0"/>
-              <a:t> to separate classes  (linearly separable)</a:t>
-            </a:r>
-            <a:endParaRPr lang="ru-RU" dirty="0"/>
-          </a:p>
-        </p:txBody>
-      </p:sp>
-      <p:sp>
-        <p:nvSpPr>
-          <p:cNvPr id="5" name="Right Arrow 4"/>
-          <p:cNvSpPr/>
-          <p:nvPr/>
-        </p:nvSpPr>
-        <p:spPr>
-          <a:xfrm>
-            <a:off x="158824" y="296708"/>
-            <a:ext cx="298376" cy="288032"/>
-          </a:xfrm>
-          <a:prstGeom prst="rightArrow">
-            <a:avLst/>
-          </a:prstGeom>
-          <a:solidFill>
-            <a:schemeClr val="bg1"/>
-          </a:solidFill>
-          <a:ln>
-            <a:solidFill>
-              <a:schemeClr val="bg1">
-                <a:lumMod val="85000"/>
-              </a:schemeClr>
-            </a:solidFill>
-          </a:ln>
-        </p:spPr>
-        <p:style>
-          <a:lnRef idx="2">
-            <a:schemeClr val="accent1">
-              <a:shade val="50000"/>
-            </a:schemeClr>
-          </a:lnRef>
-          <a:fillRef idx="1">
-            <a:schemeClr val="accent1"/>
-          </a:fillRef>
-          <a:effectRef idx="0">
-            <a:schemeClr val="accent1"/>
-          </a:effectRef>
-          <a:fontRef idx="minor">
-            <a:schemeClr val="lt1"/>
-          </a:fontRef>
-        </p:style>
-        <p:txBody>
-          <a:bodyPr rtlCol="0" anchor="ctr"/>
-          <a:lstStyle/>
-          <a:p>
-            <a:pPr algn="ctr"/>
-            <a:endParaRPr lang="en-US"/>
-          </a:p>
-        </p:txBody>
-      </p:sp>
-    </p:spTree>
-    <p:extLst>
-      <p:ext uri="{BB962C8B-B14F-4D97-AF65-F5344CB8AC3E}">
-        <p14:creationId xmlns:p14="http://schemas.microsoft.com/office/powerpoint/2010/main" val="4058012864"/>
-      </p:ext>
-    </p:extLst>
-  </p:cSld>
-  <p:clrMapOvr>
-    <a:masterClrMapping/>
-  </p:clrMapOvr>
-  <p:timing>
-    <p:tnLst>
-      <p:par>
-        <p:cTn id="1" dur="indefinite" restart="never" nodeType="tmRoot"/>
-      </p:par>
-    </p:tnLst>
-  </p:timing>
 </p:sld>
 </file>
 
@@ -9469,6 +9712,220 @@
           </a:p>
         </p:txBody>
       </p:sp>
+      <p:pic>
+        <p:nvPicPr>
+          <p:cNvPr id="11266" name="Picture 2"/>
+          <p:cNvPicPr>
+            <a:picLocks noChangeAspect="1" noChangeArrowheads="1"/>
+          </p:cNvPicPr>
+          <p:nvPr/>
+        </p:nvPicPr>
+        <p:blipFill>
+          <a:blip r:embed="rId3" cstate="print">
+            <a:extLst>
+              <a:ext uri="{28A0092B-C50C-407E-A947-70E740481C1C}">
+                <a14:useLocalDpi xmlns:a14="http://schemas.microsoft.com/office/drawing/2010/main" val="0"/>
+              </a:ext>
+            </a:extLst>
+          </a:blip>
+          <a:srcRect/>
+          <a:stretch>
+            <a:fillRect/>
+          </a:stretch>
+        </p:blipFill>
+        <p:spPr bwMode="auto">
+          <a:xfrm>
+            <a:off x="1979712" y="1628800"/>
+            <a:ext cx="5006706" cy="4869159"/>
+          </a:xfrm>
+          <a:prstGeom prst="rect">
+            <a:avLst/>
+          </a:prstGeom>
+          <a:noFill/>
+          <a:ln>
+            <a:noFill/>
+          </a:ln>
+          <a:effectLst/>
+          <a:extLst>
+            <a:ext uri="{909E8E84-426E-40DD-AFC4-6F175D3DCCD1}">
+              <a14:hiddenFill xmlns:a14="http://schemas.microsoft.com/office/drawing/2010/main">
+                <a:solidFill>
+                  <a:schemeClr val="accent1"/>
+                </a:solidFill>
+              </a14:hiddenFill>
+            </a:ext>
+            <a:ext uri="{91240B29-F687-4F45-9708-019B960494DF}">
+              <a14:hiddenLine xmlns:a14="http://schemas.microsoft.com/office/drawing/2010/main" w="9525">
+                <a:solidFill>
+                  <a:schemeClr val="tx1"/>
+                </a:solidFill>
+                <a:miter lim="800000"/>
+                <a:headEnd/>
+                <a:tailEnd/>
+              </a14:hiddenLine>
+            </a:ext>
+            <a:ext uri="{AF507438-7753-43E0-B8FC-AC1667EBCBE1}">
+              <a14:hiddenEffects xmlns:a14="http://schemas.microsoft.com/office/drawing/2010/main">
+                <a:effectLst>
+                  <a:outerShdw dist="35921" dir="2700000" algn="ctr" rotWithShape="0">
+                    <a:schemeClr val="bg2"/>
+                  </a:outerShdw>
+                </a:effectLst>
+              </a14:hiddenEffects>
+            </a:ext>
+          </a:extLst>
+        </p:spPr>
+      </p:pic>
+      <p:sp>
+        <p:nvSpPr>
+          <p:cNvPr id="3" name="TextBox 2"/>
+          <p:cNvSpPr txBox="1"/>
+          <p:nvPr/>
+        </p:nvSpPr>
+        <p:spPr>
+          <a:xfrm>
+            <a:off x="395536" y="1124744"/>
+            <a:ext cx="8424936" cy="369332"/>
+          </a:xfrm>
+          <a:prstGeom prst="rect">
+            <a:avLst/>
+          </a:prstGeom>
+          <a:noFill/>
+        </p:spPr>
+        <p:txBody>
+          <a:bodyPr wrap="square" rtlCol="0">
+            <a:spAutoFit/>
+          </a:bodyPr>
+          <a:lstStyle/>
+          <a:p>
+            <a:r>
+              <a:rPr lang="en-US" dirty="0" smtClean="0"/>
+              <a:t>Create </a:t>
+            </a:r>
+            <a:r>
+              <a:rPr lang="en-US" dirty="0" err="1" smtClean="0"/>
+              <a:t>hyperplane</a:t>
+            </a:r>
+            <a:r>
+              <a:rPr lang="en-US" dirty="0" smtClean="0"/>
+              <a:t> to separate classes  (linearly separable)</a:t>
+            </a:r>
+            <a:endParaRPr lang="ru-RU" dirty="0"/>
+          </a:p>
+        </p:txBody>
+      </p:sp>
+      <p:sp>
+        <p:nvSpPr>
+          <p:cNvPr id="5" name="Right Arrow 4"/>
+          <p:cNvSpPr/>
+          <p:nvPr/>
+        </p:nvSpPr>
+        <p:spPr>
+          <a:xfrm>
+            <a:off x="158824" y="296708"/>
+            <a:ext cx="298376" cy="288032"/>
+          </a:xfrm>
+          <a:prstGeom prst="rightArrow">
+            <a:avLst/>
+          </a:prstGeom>
+          <a:solidFill>
+            <a:schemeClr val="bg1"/>
+          </a:solidFill>
+          <a:ln>
+            <a:solidFill>
+              <a:schemeClr val="bg1">
+                <a:lumMod val="85000"/>
+              </a:schemeClr>
+            </a:solidFill>
+          </a:ln>
+        </p:spPr>
+        <p:style>
+          <a:lnRef idx="2">
+            <a:schemeClr val="accent1">
+              <a:shade val="50000"/>
+            </a:schemeClr>
+          </a:lnRef>
+          <a:fillRef idx="1">
+            <a:schemeClr val="accent1"/>
+          </a:fillRef>
+          <a:effectRef idx="0">
+            <a:schemeClr val="accent1"/>
+          </a:effectRef>
+          <a:fontRef idx="minor">
+            <a:schemeClr val="lt1"/>
+          </a:fontRef>
+        </p:style>
+        <p:txBody>
+          <a:bodyPr rtlCol="0" anchor="ctr"/>
+          <a:lstStyle/>
+          <a:p>
+            <a:pPr algn="ctr"/>
+            <a:endParaRPr lang="en-US"/>
+          </a:p>
+        </p:txBody>
+      </p:sp>
+    </p:spTree>
+    <p:extLst>
+      <p:ext uri="{BB962C8B-B14F-4D97-AF65-F5344CB8AC3E}">
+        <p14:creationId xmlns:p14="http://schemas.microsoft.com/office/powerpoint/2010/main" val="4058012864"/>
+      </p:ext>
+    </p:extLst>
+  </p:cSld>
+  <p:clrMapOvr>
+    <a:masterClrMapping/>
+  </p:clrMapOvr>
+  <p:timing>
+    <p:tnLst>
+      <p:par>
+        <p:cTn id="1" dur="indefinite" restart="never" nodeType="tmRoot"/>
+      </p:par>
+    </p:tnLst>
+  </p:timing>
+</p:sld>
+</file>
+
+<file path=ppt/slides/slide21.xml><?xml version="1.0" encoding="utf-8"?>
+<p:sld xmlns:a="http://schemas.openxmlformats.org/drawingml/2006/main" xmlns:r="http://schemas.openxmlformats.org/officeDocument/2006/relationships" xmlns:p="http://schemas.openxmlformats.org/presentationml/2006/main">
+  <p:cSld>
+    <p:spTree>
+      <p:nvGrpSpPr>
+        <p:cNvPr id="1" name=""/>
+        <p:cNvGrpSpPr/>
+        <p:nvPr/>
+      </p:nvGrpSpPr>
+      <p:grpSpPr>
+        <a:xfrm>
+          <a:off x="0" y="0"/>
+          <a:ext cx="0" cy="0"/>
+          <a:chOff x="0" y="0"/>
+          <a:chExt cx="0" cy="0"/>
+        </a:xfrm>
+      </p:grpSpPr>
+      <p:sp>
+        <p:nvSpPr>
+          <p:cNvPr id="2" name="Заголовок 1"/>
+          <p:cNvSpPr>
+            <a:spLocks noGrp="1"/>
+          </p:cNvSpPr>
+          <p:nvPr>
+            <p:ph type="title"/>
+          </p:nvPr>
+        </p:nvSpPr>
+        <p:spPr/>
+        <p:txBody>
+          <a:bodyPr>
+            <a:normAutofit/>
+          </a:bodyPr>
+          <a:lstStyle/>
+          <a:p>
+            <a:r>
+              <a:rPr lang="en-US" dirty="0" smtClean="0"/>
+              <a:t>Support Vector Machine</a:t>
+            </a:r>
+            <a:endParaRPr lang="ru-RU" dirty="0"/>
+          </a:p>
+        </p:txBody>
+      </p:sp>
       <p:sp>
         <p:nvSpPr>
           <p:cNvPr id="3" name="TextBox 2"/>
@@ -9599,7 +10056,7 @@
 </p:sld>
 </file>
 
-<file path=ppt/slides/slide21.xml><?xml version="1.0" encoding="utf-8"?>
+<file path=ppt/slides/slide22.xml><?xml version="1.0" encoding="utf-8"?>
 <p:sld xmlns:a="http://schemas.openxmlformats.org/drawingml/2006/main" xmlns:r="http://schemas.openxmlformats.org/officeDocument/2006/relationships" xmlns:p="http://schemas.openxmlformats.org/presentationml/2006/main">
   <p:cSld>
     <p:spTree>
@@ -9815,8 +10272,8 @@
           </a:extLst>
         </p:spPr>
       </p:pic>
-      <mc:AlternateContent xmlns:mc="http://schemas.openxmlformats.org/markup-compatibility/2006">
-        <mc:Choice xmlns:a14="http://schemas.microsoft.com/office/drawing/2010/main" Requires="a14">
+      <mc:AlternateContent xmlns:mc="http://schemas.openxmlformats.org/markup-compatibility/2006" xmlns:a14="http://schemas.microsoft.com/office/drawing/2010/main">
+        <mc:Choice Requires="a14">
           <p:sp>
             <p:nvSpPr>
               <p:cNvPr id="4" name="TextBox 3"/>
@@ -10044,7 +10501,7 @@
             </p:txBody>
           </p:sp>
         </mc:Choice>
-        <mc:Fallback>
+        <mc:Fallback xmlns="">
           <p:sp>
             <p:nvSpPr>
               <p:cNvPr id="4" name="TextBox 3"/>
@@ -10150,6 +10607,379 @@
       </p:par>
     </p:tnLst>
   </p:timing>
+</p:sld>
+</file>
+
+<file path=ppt/slides/slide23.xml><?xml version="1.0" encoding="utf-8"?>
+<p:sld xmlns:a="http://schemas.openxmlformats.org/drawingml/2006/main" xmlns:r="http://schemas.openxmlformats.org/officeDocument/2006/relationships" xmlns:p="http://schemas.openxmlformats.org/presentationml/2006/main">
+  <p:cSld>
+    <p:spTree>
+      <p:nvGrpSpPr>
+        <p:cNvPr id="1" name=""/>
+        <p:cNvGrpSpPr/>
+        <p:nvPr/>
+      </p:nvGrpSpPr>
+      <p:grpSpPr>
+        <a:xfrm>
+          <a:off x="0" y="0"/>
+          <a:ext cx="0" cy="0"/>
+          <a:chOff x="0" y="0"/>
+          <a:chExt cx="0" cy="0"/>
+        </a:xfrm>
+      </p:grpSpPr>
+      <p:sp>
+        <p:nvSpPr>
+          <p:cNvPr id="2" name="Title 1"/>
+          <p:cNvSpPr>
+            <a:spLocks noGrp="1"/>
+          </p:cNvSpPr>
+          <p:nvPr>
+            <p:ph type="title"/>
+          </p:nvPr>
+        </p:nvSpPr>
+        <p:spPr/>
+        <p:txBody>
+          <a:bodyPr/>
+          <a:lstStyle/>
+          <a:p>
+            <a:r>
+              <a:rPr lang="en-US" dirty="0" smtClean="0"/>
+              <a:t>SVM </a:t>
+            </a:r>
+            <a:r>
+              <a:rPr lang="en-US" dirty="0" err="1" smtClean="0"/>
+              <a:t>Hyperparameters</a:t>
+            </a:r>
+            <a:endParaRPr lang="en-US" dirty="0"/>
+          </a:p>
+        </p:txBody>
+      </p:sp>
+      <mc:AlternateContent xmlns:mc="http://schemas.openxmlformats.org/markup-compatibility/2006">
+        <mc:Choice xmlns:a14="http://schemas.microsoft.com/office/drawing/2010/main" Requires="a14">
+          <p:sp>
+            <p:nvSpPr>
+              <p:cNvPr id="3" name="Content Placeholder 2"/>
+              <p:cNvSpPr>
+                <a:spLocks noGrp="1"/>
+              </p:cNvSpPr>
+              <p:nvPr>
+                <p:ph idx="1"/>
+              </p:nvPr>
+            </p:nvSpPr>
+            <p:spPr/>
+            <p:txBody>
+              <a:bodyPr>
+                <a:normAutofit/>
+              </a:bodyPr>
+              <a:lstStyle/>
+              <a:p>
+                <a:r>
+                  <a:rPr lang="en-US" sz="1800" b="1" dirty="0" smtClean="0"/>
+                  <a:t>C</a:t>
+                </a:r>
+                <a:r>
+                  <a:rPr lang="en-US" sz="1800" dirty="0" smtClean="0"/>
+                  <a:t> – margin violation factor. Lower C leads to more sensitivity to training data –render SVM vulnerable to overfitting.</a:t>
+                </a:r>
+              </a:p>
+              <a:p>
+                <a:r>
+                  <a:rPr lang="en-US" sz="1800" b="1" dirty="0" smtClean="0"/>
+                  <a:t>Kernel – </a:t>
+                </a:r>
+                <a:r>
+                  <a:rPr lang="en-US" sz="1800" dirty="0" smtClean="0"/>
+                  <a:t>(Linear, Poly, Radial Basis Function) – define measure between </a:t>
+                </a:r>
+                <a:r>
+                  <a:rPr lang="en-US" sz="1800" dirty="0" err="1" smtClean="0"/>
+                  <a:t>datapoint</a:t>
+                </a:r>
+                <a:r>
+                  <a:rPr lang="en-US" sz="1800" dirty="0" smtClean="0"/>
+                  <a:t> and support vector</a:t>
+                </a:r>
+              </a:p>
+              <a:p>
+                <a:r>
+                  <a:rPr lang="en-US" sz="1800" b="1" dirty="0" smtClean="0"/>
+                  <a:t>Gamma (RBF):  </a:t>
+                </a:r>
+                <a14:m>
+                  <m:oMath xmlns:m="http://schemas.openxmlformats.org/officeDocument/2006/math">
+                    <m:r>
+                      <a:rPr lang="en-US" sz="1800" b="1" i="0" smtClean="0">
+                        <a:latin typeface="Cambria Math" panose="02040503050406030204" pitchFamily="18" charset="0"/>
+                      </a:rPr>
+                      <m:t>𝐊</m:t>
+                    </m:r>
+                    <m:r>
+                      <a:rPr lang="en-US" sz="1800" b="1" i="0" smtClean="0">
+                        <a:latin typeface="Cambria Math" panose="02040503050406030204" pitchFamily="18" charset="0"/>
+                      </a:rPr>
+                      <m:t>(</m:t>
+                    </m:r>
+                    <m:r>
+                      <a:rPr lang="en-US" sz="1800" b="1" i="1" smtClean="0">
+                        <a:latin typeface="Cambria Math" panose="02040503050406030204" pitchFamily="18" charset="0"/>
+                      </a:rPr>
+                      <m:t>𝒙</m:t>
+                    </m:r>
+                    <m:r>
+                      <a:rPr lang="en-US" sz="1800" b="1" i="0" smtClean="0">
+                        <a:latin typeface="Cambria Math" panose="02040503050406030204" pitchFamily="18" charset="0"/>
+                      </a:rPr>
+                      <m:t>,</m:t>
+                    </m:r>
+                    <m:sSub>
+                      <m:sSubPr>
+                        <m:ctrlPr>
+                          <a:rPr lang="en-US" sz="1800" b="1" i="1" smtClean="0">
+                            <a:latin typeface="Cambria Math" panose="02040503050406030204" pitchFamily="18" charset="0"/>
+                          </a:rPr>
+                        </m:ctrlPr>
+                      </m:sSubPr>
+                      <m:e>
+                        <m:r>
+                          <a:rPr lang="en-US" sz="1800" b="1" i="1" smtClean="0">
+                            <a:latin typeface="Cambria Math" panose="02040503050406030204" pitchFamily="18" charset="0"/>
+                          </a:rPr>
+                          <m:t>𝒙</m:t>
+                        </m:r>
+                      </m:e>
+                      <m:sub>
+                        <m:r>
+                          <a:rPr lang="en-US" sz="1800" b="1" i="1" smtClean="0">
+                            <a:latin typeface="Cambria Math" panose="02040503050406030204" pitchFamily="18" charset="0"/>
+                          </a:rPr>
+                          <m:t>𝒊</m:t>
+                        </m:r>
+                      </m:sub>
+                    </m:sSub>
+                    <m:r>
+                      <a:rPr lang="en-US" sz="1800" b="1" i="0" smtClean="0">
+                        <a:latin typeface="Cambria Math" panose="02040503050406030204" pitchFamily="18" charset="0"/>
+                      </a:rPr>
+                      <m:t>)</m:t>
+                    </m:r>
+                    <m:r>
+                      <a:rPr lang="en-US" sz="1800" b="1" i="1" smtClean="0">
+                        <a:latin typeface="Cambria Math" panose="02040503050406030204" pitchFamily="18" charset="0"/>
+                      </a:rPr>
+                      <m:t>=</m:t>
+                    </m:r>
+                    <m:sSup>
+                      <m:sSupPr>
+                        <m:ctrlPr>
+                          <a:rPr lang="en-US" sz="1800" b="1" i="1" smtClean="0">
+                            <a:latin typeface="Cambria Math" panose="02040503050406030204" pitchFamily="18" charset="0"/>
+                          </a:rPr>
+                        </m:ctrlPr>
+                      </m:sSupPr>
+                      <m:e>
+                        <m:r>
+                          <a:rPr lang="en-US" sz="1800" b="1" i="1" smtClean="0">
+                            <a:latin typeface="Cambria Math" panose="02040503050406030204" pitchFamily="18" charset="0"/>
+                          </a:rPr>
+                          <m:t>𝒆</m:t>
+                        </m:r>
+                      </m:e>
+                      <m:sup>
+                        <m:r>
+                          <a:rPr lang="en-US" sz="1800" b="1" i="1" smtClean="0">
+                            <a:latin typeface="Cambria Math" panose="02040503050406030204" pitchFamily="18" charset="0"/>
+                          </a:rPr>
+                          <m:t>−</m:t>
+                        </m:r>
+                        <m:r>
+                          <a:rPr lang="en-US" sz="1800" b="1" i="1" smtClean="0">
+                            <a:latin typeface="Cambria Math" panose="02040503050406030204" pitchFamily="18" charset="0"/>
+                            <a:ea typeface="Cambria Math" panose="02040503050406030204" pitchFamily="18" charset="0"/>
+                          </a:rPr>
+                          <m:t>𝜸</m:t>
+                        </m:r>
+                        <m:nary>
+                          <m:naryPr>
+                            <m:chr m:val="∑"/>
+                            <m:subHide m:val="on"/>
+                            <m:supHide m:val="on"/>
+                            <m:ctrlPr>
+                              <a:rPr lang="en-US" sz="1800" b="1" i="1" smtClean="0">
+                                <a:latin typeface="Cambria Math" panose="02040503050406030204" pitchFamily="18" charset="0"/>
+                                <a:ea typeface="Cambria Math" panose="02040503050406030204" pitchFamily="18" charset="0"/>
+                              </a:rPr>
+                            </m:ctrlPr>
+                          </m:naryPr>
+                          <m:sub/>
+                          <m:sup/>
+                          <m:e>
+                            <m:r>
+                              <a:rPr lang="en-US" sz="1800" b="1" i="1" smtClean="0">
+                                <a:latin typeface="Cambria Math" panose="02040503050406030204" pitchFamily="18" charset="0"/>
+                                <a:ea typeface="Cambria Math" panose="02040503050406030204" pitchFamily="18" charset="0"/>
+                              </a:rPr>
+                              <m:t>(</m:t>
+                            </m:r>
+                            <m:sSup>
+                              <m:sSupPr>
+                                <m:ctrlPr>
+                                  <a:rPr lang="en-US" sz="1800" b="1" i="1" smtClean="0">
+                                    <a:latin typeface="Cambria Math" panose="02040503050406030204" pitchFamily="18" charset="0"/>
+                                    <a:ea typeface="Cambria Math" panose="02040503050406030204" pitchFamily="18" charset="0"/>
+                                  </a:rPr>
+                                </m:ctrlPr>
+                              </m:sSupPr>
+                              <m:e>
+                                <m:d>
+                                  <m:dPr>
+                                    <m:ctrlPr>
+                                      <a:rPr lang="en-US" sz="1800" b="1" i="1">
+                                        <a:latin typeface="Cambria Math" panose="02040503050406030204" pitchFamily="18" charset="0"/>
+                                        <a:ea typeface="Cambria Math" panose="02040503050406030204" pitchFamily="18" charset="0"/>
+                                      </a:rPr>
+                                    </m:ctrlPr>
+                                  </m:dPr>
+                                  <m:e>
+                                    <m:r>
+                                      <a:rPr lang="en-US" sz="1800" b="1" i="1">
+                                        <a:latin typeface="Cambria Math" panose="02040503050406030204" pitchFamily="18" charset="0"/>
+                                        <a:ea typeface="Cambria Math" panose="02040503050406030204" pitchFamily="18" charset="0"/>
+                                      </a:rPr>
+                                      <m:t>𝒙</m:t>
+                                    </m:r>
+                                    <m:r>
+                                      <a:rPr lang="en-US" sz="1800" b="1" i="1">
+                                        <a:latin typeface="Cambria Math" panose="02040503050406030204" pitchFamily="18" charset="0"/>
+                                        <a:ea typeface="Cambria Math" panose="02040503050406030204" pitchFamily="18" charset="0"/>
+                                      </a:rPr>
+                                      <m:t>−</m:t>
+                                    </m:r>
+                                    <m:sSub>
+                                      <m:sSubPr>
+                                        <m:ctrlPr>
+                                          <a:rPr lang="en-US" sz="1800" b="1" i="1">
+                                            <a:latin typeface="Cambria Math" panose="02040503050406030204" pitchFamily="18" charset="0"/>
+                                            <a:ea typeface="Cambria Math" panose="02040503050406030204" pitchFamily="18" charset="0"/>
+                                          </a:rPr>
+                                        </m:ctrlPr>
+                                      </m:sSubPr>
+                                      <m:e>
+                                        <m:r>
+                                          <a:rPr lang="en-US" sz="1800" b="1" i="1">
+                                            <a:latin typeface="Cambria Math" panose="02040503050406030204" pitchFamily="18" charset="0"/>
+                                            <a:ea typeface="Cambria Math" panose="02040503050406030204" pitchFamily="18" charset="0"/>
+                                          </a:rPr>
+                                          <m:t>𝒙</m:t>
+                                        </m:r>
+                                      </m:e>
+                                      <m:sub>
+                                        <m:r>
+                                          <a:rPr lang="en-US" sz="1800" b="1" i="1">
+                                            <a:latin typeface="Cambria Math" panose="02040503050406030204" pitchFamily="18" charset="0"/>
+                                            <a:ea typeface="Cambria Math" panose="02040503050406030204" pitchFamily="18" charset="0"/>
+                                          </a:rPr>
+                                          <m:t>𝒊</m:t>
+                                        </m:r>
+                                      </m:sub>
+                                    </m:sSub>
+                                  </m:e>
+                                </m:d>
+                              </m:e>
+                              <m:sup>
+                                <m:r>
+                                  <a:rPr lang="en-US" sz="1800" b="1" i="1" smtClean="0">
+                                    <a:latin typeface="Cambria Math" panose="02040503050406030204" pitchFamily="18" charset="0"/>
+                                    <a:ea typeface="Cambria Math" panose="02040503050406030204" pitchFamily="18" charset="0"/>
+                                  </a:rPr>
+                                  <m:t>𝟐</m:t>
+                                </m:r>
+                              </m:sup>
+                            </m:sSup>
+                            <m:r>
+                              <a:rPr lang="en-US" sz="1800" b="1" i="1" smtClean="0">
+                                <a:latin typeface="Cambria Math" panose="02040503050406030204" pitchFamily="18" charset="0"/>
+                                <a:ea typeface="Cambria Math" panose="02040503050406030204" pitchFamily="18" charset="0"/>
+                              </a:rPr>
+                              <m:t>)</m:t>
+                            </m:r>
+                          </m:e>
+                        </m:nary>
+                      </m:sup>
+                    </m:sSup>
+                  </m:oMath>
+                </a14:m>
+                <a:endParaRPr lang="en-US" sz="1800" b="1" dirty="0" smtClean="0"/>
+              </a:p>
+              <a:p>
+                <a:pPr marL="0" indent="0">
+                  <a:buNone/>
+                </a:pPr>
+                <a:r>
+                  <a:rPr lang="en-US" sz="1800" dirty="0" smtClean="0"/>
+                  <a:t>If </a:t>
+                </a:r>
+                <a:r>
+                  <a:rPr lang="en-US" sz="1800" dirty="0"/>
+                  <a:t>gamma is too large, the radius of the area of influence of the support vectors only includes the support vector itself and no amount of regularization with C will be able to prevent overfitting.</a:t>
+                </a:r>
+                <a:endParaRPr lang="en-US" sz="1800" dirty="0" smtClean="0"/>
+              </a:p>
+              <a:p>
+                <a:pPr marL="0" indent="0">
+                  <a:buNone/>
+                </a:pPr>
+                <a:r>
+                  <a:rPr lang="en-US" sz="1800" dirty="0"/>
+                  <a:t>When gamma is very small, the model is too constrained and cannot capture the complexity or “shape” of the data. </a:t>
+                </a:r>
+              </a:p>
+            </p:txBody>
+          </p:sp>
+        </mc:Choice>
+        <mc:Fallback>
+          <p:sp>
+            <p:nvSpPr>
+              <p:cNvPr id="3" name="Content Placeholder 2"/>
+              <p:cNvSpPr>
+                <a:spLocks noGrp="1" noRot="1" noChangeAspect="1" noMove="1" noResize="1" noEditPoints="1" noAdjustHandles="1" noChangeArrowheads="1" noChangeShapeType="1" noTextEdit="1"/>
+              </p:cNvSpPr>
+              <p:nvPr>
+                <p:ph idx="1"/>
+              </p:nvPr>
+            </p:nvSpPr>
+            <p:spPr>
+              <a:blipFill rotWithShape="0">
+                <a:blip r:embed="rId2"/>
+                <a:stretch>
+                  <a:fillRect l="-593" t="-809"/>
+                </a:stretch>
+              </a:blipFill>
+            </p:spPr>
+            <p:txBody>
+              <a:bodyPr/>
+              <a:lstStyle/>
+              <a:p>
+                <a:r>
+                  <a:rPr lang="en-US">
+                    <a:noFill/>
+                  </a:rPr>
+                  <a:t> </a:t>
+                </a:r>
+              </a:p>
+            </p:txBody>
+          </p:sp>
+        </mc:Fallback>
+      </mc:AlternateContent>
+    </p:spTree>
+    <p:extLst>
+      <p:ext uri="{BB962C8B-B14F-4D97-AF65-F5344CB8AC3E}">
+        <p14:creationId xmlns:p14="http://schemas.microsoft.com/office/powerpoint/2010/main" val="3701197177"/>
+      </p:ext>
+    </p:extLst>
+  </p:cSld>
+  <p:clrMapOvr>
+    <a:masterClrMapping/>
+  </p:clrMapOvr>
 </p:sld>
 </file>
 

</xml_diff>